<commit_message>
add box plot results
</commit_message>
<xml_diff>
--- a/Presentation/ddpg-dg.pptx
+++ b/Presentation/ddpg-dg.pptx
@@ -5,7 +5,7 @@
     <p:sldMasterId id="2147483660" r:id="rId1"/>
   </p:sldMasterIdLst>
   <p:notesMasterIdLst>
-    <p:notesMasterId r:id="rId15"/>
+    <p:notesMasterId r:id="rId16"/>
   </p:notesMasterIdLst>
   <p:sldIdLst>
     <p:sldId id="265" r:id="rId2"/>
@@ -19,8 +19,9 @@
     <p:sldId id="272" r:id="rId10"/>
     <p:sldId id="273" r:id="rId11"/>
     <p:sldId id="274" r:id="rId12"/>
-    <p:sldId id="276" r:id="rId13"/>
-    <p:sldId id="277" r:id="rId14"/>
+    <p:sldId id="278" r:id="rId13"/>
+    <p:sldId id="276" r:id="rId14"/>
+    <p:sldId id="277" r:id="rId15"/>
   </p:sldIdLst>
   <p:sldSz cx="9144000" cy="6858000" type="screen4x3"/>
   <p:notesSz cx="6858000" cy="9144000"/>
@@ -130,12 +131,7 @@
 <file path=ppt/revisionInfo.xml><?xml version="1.0" encoding="utf-8"?>
 <p1510:revInfo xmlns:a="http://schemas.openxmlformats.org/drawingml/2006/main" xmlns:r="http://schemas.openxmlformats.org/officeDocument/2006/relationships" xmlns:p1510="http://schemas.microsoft.com/office/powerpoint/2015/10/main">
   <p1510:revLst>
-    <p1510:client id="{00CD6C7E-4769-FB7F-8DC1-9AB7714902B4}" v="268" dt="2025-05-15T11:23:03.349"/>
-    <p1510:client id="{495AC2C0-B335-E857-C517-EC7DCA5ACEA2}" v="6" dt="2025-05-14T10:11:07.036"/>
-    <p1510:client id="{8E8F630F-BC3F-4201-B685-FE0DD8661951}" v="133" dt="2025-05-13T16:16:11.667"/>
-    <p1510:client id="{C1531825-96AB-03E2-7A7B-9BA9A6FF1229}" v="291" dt="2025-05-14T22:44:14.328"/>
-    <p1510:client id="{D731A987-A025-9831-BBCE-8A651471A270}" v="73" dt="2025-05-13T17:00:42.747"/>
-    <p1510:client id="{F34A72F1-3DC7-4ABD-645E-8001CD1C0718}" v="81" dt="2025-05-15T11:45:07.575"/>
+    <p1510:client id="{FE970B72-CBDB-CFC3-8C2D-1E5EF6515E8B}" v="94" dt="2025-05-17T13:12:33.837"/>
   </p1510:revLst>
 </p1510:revInfo>
 </file>
@@ -222,7 +218,7 @@
           <a:p>
             <a:fld id="{931A0CEF-2A39-484F-A352-F8A28BE253E6}" type="datetimeFigureOut">
               <a:rPr lang="en-US" smtClean="0"/>
-              <a:t>5/15/2025</a:t>
+              <a:t>5/17/2025</a:t>
             </a:fld>
             <a:endParaRPr lang="en-US"/>
           </a:p>
@@ -618,7 +614,7 @@
           <a:p>
             <a:fld id="{5DEF2555-5E9E-4546-A627-6BF7356FD362}" type="datetime1">
               <a:rPr lang="en-US" smtClean="0"/>
-              <a:t>5/15/2025</a:t>
+              <a:t>5/17/2025</a:t>
             </a:fld>
             <a:endParaRPr lang="en-US"/>
           </a:p>
@@ -786,7 +782,7 @@
           <a:p>
             <a:fld id="{1274DB5C-BF55-43DC-81ED-041B5B1DCBC7}" type="datetime1">
               <a:rPr lang="en-US" smtClean="0"/>
-              <a:t>5/15/2025</a:t>
+              <a:t>5/17/2025</a:t>
             </a:fld>
             <a:endParaRPr lang="en-US"/>
           </a:p>
@@ -964,7 +960,7 @@
           <a:p>
             <a:fld id="{E02E6E78-100A-4215-9BAA-F31531A5E29A}" type="datetime1">
               <a:rPr lang="en-US" smtClean="0"/>
-              <a:t>5/15/2025</a:t>
+              <a:t>5/17/2025</a:t>
             </a:fld>
             <a:endParaRPr lang="en-US"/>
           </a:p>
@@ -1132,7 +1128,7 @@
           <a:p>
             <a:fld id="{E61B24C7-E4C4-424D-B364-3216989C782C}" type="datetime1">
               <a:rPr lang="en-US" smtClean="0"/>
-              <a:t>5/15/2025</a:t>
+              <a:t>5/17/2025</a:t>
             </a:fld>
             <a:endParaRPr lang="en-US"/>
           </a:p>
@@ -1377,7 +1373,7 @@
           <a:p>
             <a:fld id="{E9B23B95-E2BE-4D61-9995-03C1FEC0D7A5}" type="datetime1">
               <a:rPr lang="en-US" smtClean="0"/>
-              <a:t>5/15/2025</a:t>
+              <a:t>5/17/2025</a:t>
             </a:fld>
             <a:endParaRPr lang="en-US"/>
           </a:p>
@@ -1606,7 +1602,7 @@
           <a:p>
             <a:fld id="{50C5AC31-35C8-463A-94B7-750D20128F0F}" type="datetime1">
               <a:rPr lang="en-US" smtClean="0"/>
-              <a:t>5/15/2025</a:t>
+              <a:t>5/17/2025</a:t>
             </a:fld>
             <a:endParaRPr lang="en-US"/>
           </a:p>
@@ -1970,7 +1966,7 @@
           <a:p>
             <a:fld id="{DE5C6B56-E592-46FF-9944-2664C38542C9}" type="datetime1">
               <a:rPr lang="en-US" smtClean="0"/>
-              <a:t>5/15/2025</a:t>
+              <a:t>5/17/2025</a:t>
             </a:fld>
             <a:endParaRPr lang="en-US"/>
           </a:p>
@@ -2087,7 +2083,7 @@
           <a:p>
             <a:fld id="{EBB8F8D7-3EE9-4A9D-863C-577C68B52A9A}" type="datetime1">
               <a:rPr lang="en-US" smtClean="0"/>
-              <a:t>5/15/2025</a:t>
+              <a:t>5/17/2025</a:t>
             </a:fld>
             <a:endParaRPr lang="en-US"/>
           </a:p>
@@ -2182,7 +2178,7 @@
           <a:p>
             <a:fld id="{2CE3E712-FC39-45A1-B734-6DD6E6281225}" type="datetime1">
               <a:rPr lang="en-US" smtClean="0"/>
-              <a:t>5/15/2025</a:t>
+              <a:t>5/17/2025</a:t>
             </a:fld>
             <a:endParaRPr lang="en-US"/>
           </a:p>
@@ -2457,7 +2453,7 @@
           <a:p>
             <a:fld id="{33DDE1C3-3724-4DB5-BA00-C8D8267D23A0}" type="datetime1">
               <a:rPr lang="en-US" smtClean="0"/>
-              <a:t>5/15/2025</a:t>
+              <a:t>5/17/2025</a:t>
             </a:fld>
             <a:endParaRPr lang="en-US"/>
           </a:p>
@@ -2712,7 +2708,7 @@
           <a:p>
             <a:fld id="{D12A5C49-E1FA-493D-9D78-62551EB96D9B}" type="datetime1">
               <a:rPr lang="en-US" smtClean="0"/>
-              <a:t>5/15/2025</a:t>
+              <a:t>5/17/2025</a:t>
             </a:fld>
             <a:endParaRPr lang="en-US"/>
           </a:p>
@@ -2923,7 +2919,7 @@
           <a:p>
             <a:fld id="{755607E7-194F-4CC7-ADB4-CB74AC04A92E}" type="datetime1">
               <a:rPr lang="en-US" smtClean="0"/>
-              <a:t>5/15/2025</a:t>
+              <a:t>5/17/2025</a:t>
             </a:fld>
             <a:endParaRPr lang="en-US"/>
           </a:p>
@@ -4390,6 +4386,456 @@
         <p:cNvPr id="1" name="">
           <a:extLst>
             <a:ext uri="{FF2B5EF4-FFF2-40B4-BE49-F238E27FC236}">
+              <a16:creationId xmlns:a16="http://schemas.microsoft.com/office/drawing/2014/main" id="{0F427C61-D994-ECA8-7A09-F478776850B5}"/>
+            </a:ext>
+          </a:extLst>
+        </p:cNvPr>
+        <p:cNvGrpSpPr/>
+        <p:nvPr/>
+      </p:nvGrpSpPr>
+      <p:grpSpPr>
+        <a:xfrm>
+          <a:off x="0" y="0"/>
+          <a:ext cx="0" cy="0"/>
+          <a:chOff x="0" y="0"/>
+          <a:chExt cx="0" cy="0"/>
+        </a:xfrm>
+      </p:grpSpPr>
+      <p:sp>
+        <p:nvSpPr>
+          <p:cNvPr id="2" name="Title 1">
+            <a:extLst>
+              <a:ext uri="{FF2B5EF4-FFF2-40B4-BE49-F238E27FC236}">
+                <a16:creationId xmlns:a16="http://schemas.microsoft.com/office/drawing/2014/main" id="{5E38C8A2-61CF-DCE6-A3D9-FD9DDA657D14}"/>
+              </a:ext>
+            </a:extLst>
+          </p:cNvPr>
+          <p:cNvSpPr>
+            <a:spLocks noGrp="1"/>
+          </p:cNvSpPr>
+          <p:nvPr>
+            <p:ph type="title"/>
+          </p:nvPr>
+        </p:nvSpPr>
+        <p:spPr>
+          <a:xfrm>
+            <a:off x="210312" y="1161288"/>
+            <a:ext cx="8741664" cy="832104"/>
+          </a:xfrm>
+        </p:spPr>
+        <p:txBody>
+          <a:bodyPr>
+            <a:normAutofit/>
+          </a:bodyPr>
+          <a:lstStyle/>
+          <a:p>
+            <a:r>
+              <a:rPr lang="en-US" sz="2400" dirty="0">
+                <a:latin typeface="Times New Roman"/>
+                <a:ea typeface="+mj-lt"/>
+                <a:cs typeface="+mj-lt"/>
+              </a:rPr>
+              <a:t>Robustness Tests</a:t>
+            </a:r>
+            <a:endParaRPr lang="en-US" sz="2400">
+              <a:latin typeface="Times New Roman"/>
+              <a:cs typeface="Times New Roman"/>
+            </a:endParaRPr>
+          </a:p>
+        </p:txBody>
+      </p:sp>
+      <p:sp>
+        <p:nvSpPr>
+          <p:cNvPr id="5" name="Slide Number Placeholder 4">
+            <a:extLst>
+              <a:ext uri="{FF2B5EF4-FFF2-40B4-BE49-F238E27FC236}">
+                <a16:creationId xmlns:a16="http://schemas.microsoft.com/office/drawing/2014/main" id="{9C6BE557-7347-C0A6-CB94-764718C8C2AF}"/>
+              </a:ext>
+            </a:extLst>
+          </p:cNvPr>
+          <p:cNvSpPr>
+            <a:spLocks noGrp="1"/>
+          </p:cNvSpPr>
+          <p:nvPr>
+            <p:ph type="sldNum" sz="quarter" idx="12"/>
+          </p:nvPr>
+        </p:nvSpPr>
+        <p:spPr>
+          <a:xfrm>
+            <a:off x="8257032" y="6295837"/>
+            <a:ext cx="486918" cy="391921"/>
+          </a:xfrm>
+        </p:spPr>
+        <p:txBody>
+          <a:bodyPr/>
+          <a:lstStyle/>
+          <a:p>
+            <a:fld id="{79280F48-C417-49CC-8667-060243E2EB12}" type="slidenum">
+              <a:rPr lang="en-US" sz="1600" smtClean="0">
+                <a:cs typeface="David" panose="020E0502060401010101" pitchFamily="34" charset="-79"/>
+              </a:rPr>
+              <a:t>12</a:t>
+            </a:fld>
+            <a:endParaRPr lang="en-US" sz="1600">
+              <a:cs typeface="David" panose="020E0502060401010101" pitchFamily="34" charset="-79"/>
+            </a:endParaRPr>
+          </a:p>
+        </p:txBody>
+      </p:sp>
+      <p:pic>
+        <p:nvPicPr>
+          <p:cNvPr id="7" name="Picture 6">
+            <a:extLst>
+              <a:ext uri="{FF2B5EF4-FFF2-40B4-BE49-F238E27FC236}">
+                <a16:creationId xmlns:a16="http://schemas.microsoft.com/office/drawing/2014/main" id="{27CDAC60-3083-AFE6-DC80-5702814657B3}"/>
+              </a:ext>
+            </a:extLst>
+          </p:cNvPr>
+          <p:cNvPicPr>
+            <a:picLocks noChangeAspect="1"/>
+          </p:cNvPicPr>
+          <p:nvPr/>
+        </p:nvPicPr>
+        <p:blipFill>
+          <a:blip r:embed="rId2" cstate="print">
+            <a:extLst>
+              <a:ext uri="{28A0092B-C50C-407E-A947-70E740481C1C}">
+                <a14:useLocalDpi xmlns:a14="http://schemas.microsoft.com/office/drawing/2010/main" val="0"/>
+              </a:ext>
+            </a:extLst>
+          </a:blip>
+          <a:srcRect l="2200" t="5055" b="1"/>
+          <a:stretch/>
+        </p:blipFill>
+        <p:spPr>
+          <a:xfrm>
+            <a:off x="100584" y="0"/>
+            <a:ext cx="8942832" cy="1161288"/>
+          </a:xfrm>
+          <a:prstGeom prst="rect">
+            <a:avLst/>
+          </a:prstGeom>
+        </p:spPr>
+      </p:pic>
+      <p:sp>
+        <p:nvSpPr>
+          <p:cNvPr id="8" name="Content Placeholder 7">
+            <a:extLst>
+              <a:ext uri="{FF2B5EF4-FFF2-40B4-BE49-F238E27FC236}">
+                <a16:creationId xmlns:a16="http://schemas.microsoft.com/office/drawing/2014/main" id="{AE7E7732-CAEF-CAA2-9B70-73F00D0E5AA9}"/>
+              </a:ext>
+            </a:extLst>
+          </p:cNvPr>
+          <p:cNvSpPr>
+            <a:spLocks noGrp="1"/>
+          </p:cNvSpPr>
+          <p:nvPr>
+            <p:ph idx="1"/>
+          </p:nvPr>
+        </p:nvSpPr>
+        <p:spPr>
+          <a:xfrm>
+            <a:off x="-76453" y="1932869"/>
+            <a:ext cx="7886700" cy="2985383"/>
+          </a:xfrm>
+        </p:spPr>
+        <p:txBody>
+          <a:bodyPr vert="horz" lIns="91440" tIns="45720" rIns="91440" bIns="45720" rtlCol="0" anchor="t">
+            <a:normAutofit/>
+          </a:bodyPr>
+          <a:lstStyle/>
+          <a:p>
+            <a:endParaRPr lang="en-US" sz="2200" dirty="0">
+              <a:latin typeface="Times New Roman"/>
+              <a:ea typeface="+mn-lt"/>
+              <a:cs typeface="+mn-lt"/>
+            </a:endParaRPr>
+          </a:p>
+          <a:p>
+            <a:endParaRPr lang="en-US" sz="2200" dirty="0">
+              <a:latin typeface="Times New Roman"/>
+              <a:ea typeface="+mn-lt"/>
+              <a:cs typeface="Calibri"/>
+            </a:endParaRPr>
+          </a:p>
+        </p:txBody>
+      </p:sp>
+      <p:pic>
+        <p:nvPicPr>
+          <p:cNvPr id="10" name="Picture 9" descr="A graph with numbers and lines&#10;&#10;AI-generated content may be incorrect.">
+            <a:extLst>
+              <a:ext uri="{FF2B5EF4-FFF2-40B4-BE49-F238E27FC236}">
+                <a16:creationId xmlns:a16="http://schemas.microsoft.com/office/drawing/2014/main" id="{5E8CF259-132D-14E7-7C5E-B80F845D7CA6}"/>
+              </a:ext>
+            </a:extLst>
+          </p:cNvPr>
+          <p:cNvPicPr>
+            <a:picLocks noChangeAspect="1"/>
+          </p:cNvPicPr>
+          <p:nvPr/>
+        </p:nvPicPr>
+        <p:blipFill>
+          <a:blip r:embed="rId3"/>
+          <a:stretch>
+            <a:fillRect/>
+          </a:stretch>
+        </p:blipFill>
+        <p:spPr>
+          <a:xfrm>
+            <a:off x="365011" y="2223556"/>
+            <a:ext cx="2688336" cy="2170830"/>
+          </a:xfrm>
+          <a:prstGeom prst="rect">
+            <a:avLst/>
+          </a:prstGeom>
+        </p:spPr>
+      </p:pic>
+      <p:pic>
+        <p:nvPicPr>
+          <p:cNvPr id="12" name="Picture 11" descr="A diagram of a number of points&#10;&#10;AI-generated content may be incorrect.">
+            <a:extLst>
+              <a:ext uri="{FF2B5EF4-FFF2-40B4-BE49-F238E27FC236}">
+                <a16:creationId xmlns:a16="http://schemas.microsoft.com/office/drawing/2014/main" id="{F666E24B-965E-24A0-9C4E-76C76BE1FB62}"/>
+              </a:ext>
+            </a:extLst>
+          </p:cNvPr>
+          <p:cNvPicPr>
+            <a:picLocks noChangeAspect="1"/>
+          </p:cNvPicPr>
+          <p:nvPr/>
+        </p:nvPicPr>
+        <p:blipFill>
+          <a:blip r:embed="rId4"/>
+          <a:stretch>
+            <a:fillRect/>
+          </a:stretch>
+        </p:blipFill>
+        <p:spPr>
+          <a:xfrm>
+            <a:off x="3208636" y="2307254"/>
+            <a:ext cx="2688336" cy="2002809"/>
+          </a:xfrm>
+          <a:prstGeom prst="rect">
+            <a:avLst/>
+          </a:prstGeom>
+        </p:spPr>
+      </p:pic>
+      <p:pic>
+        <p:nvPicPr>
+          <p:cNvPr id="14" name="Picture 13" descr="A diagram of a number of points&#10;&#10;AI-generated content may be incorrect.">
+            <a:extLst>
+              <a:ext uri="{FF2B5EF4-FFF2-40B4-BE49-F238E27FC236}">
+                <a16:creationId xmlns:a16="http://schemas.microsoft.com/office/drawing/2014/main" id="{D7C66442-CA18-466A-5ECA-CA357ADF1CD7}"/>
+              </a:ext>
+            </a:extLst>
+          </p:cNvPr>
+          <p:cNvPicPr>
+            <a:picLocks noChangeAspect="1"/>
+          </p:cNvPicPr>
+          <p:nvPr/>
+        </p:nvPicPr>
+        <p:blipFill>
+          <a:blip r:embed="rId5"/>
+          <a:stretch>
+            <a:fillRect/>
+          </a:stretch>
+        </p:blipFill>
+        <p:spPr>
+          <a:xfrm>
+            <a:off x="6052261" y="2310614"/>
+            <a:ext cx="2688336" cy="1996089"/>
+          </a:xfrm>
+          <a:prstGeom prst="rect">
+            <a:avLst/>
+          </a:prstGeom>
+        </p:spPr>
+      </p:pic>
+      <p:sp>
+        <p:nvSpPr>
+          <p:cNvPr id="15" name="TextBox 14">
+            <a:extLst>
+              <a:ext uri="{FF2B5EF4-FFF2-40B4-BE49-F238E27FC236}">
+                <a16:creationId xmlns:a16="http://schemas.microsoft.com/office/drawing/2014/main" id="{C221F4C8-9A69-E77D-E03E-642D60723B7D}"/>
+              </a:ext>
+            </a:extLst>
+          </p:cNvPr>
+          <p:cNvSpPr txBox="1"/>
+          <p:nvPr/>
+        </p:nvSpPr>
+        <p:spPr>
+          <a:xfrm>
+            <a:off x="953685" y="4398377"/>
+            <a:ext cx="2097250" cy="738664"/>
+          </a:xfrm>
+          <a:prstGeom prst="rect">
+            <a:avLst/>
+          </a:prstGeom>
+          <a:noFill/>
+        </p:spPr>
+        <p:txBody>
+          <a:bodyPr rot="0" spcFirstLastPara="0" vertOverflow="overflow" horzOverflow="overflow" vert="horz" wrap="square" lIns="91440" tIns="45720" rIns="91440" bIns="45720" numCol="1" spcCol="0" rtlCol="0" fromWordArt="0" anchor="t" anchorCtr="0" forceAA="0" compatLnSpc="1">
+            <a:prstTxWarp prst="textNoShape">
+              <a:avLst/>
+            </a:prstTxWarp>
+            <a:spAutoFit/>
+          </a:bodyPr>
+          <a:lstStyle/>
+          <a:p>
+            <a:pPr algn="ctr"/>
+            <a:r>
+              <a:rPr lang="en-US" sz="1200" dirty="0">
+                <a:latin typeface="Times New Roman"/>
+                <a:cs typeface="Times New Roman"/>
+              </a:rPr>
+              <a:t>presence of  gravitational parameter variation </a:t>
+            </a:r>
+            <a:endParaRPr lang="en-US" sz="1200">
+              <a:latin typeface="Times New Roman"/>
+              <a:ea typeface="Calibri"/>
+              <a:cs typeface="Times New Roman"/>
+            </a:endParaRPr>
+          </a:p>
+          <a:p>
+            <a:pPr algn="ctr"/>
+            <a:endParaRPr lang="en-US" dirty="0">
+              <a:latin typeface="Times New Roman"/>
+              <a:ea typeface="Calibri"/>
+              <a:cs typeface="Calibri"/>
+            </a:endParaRPr>
+          </a:p>
+        </p:txBody>
+      </p:sp>
+      <p:sp>
+        <p:nvSpPr>
+          <p:cNvPr id="16" name="TextBox 15">
+            <a:extLst>
+              <a:ext uri="{FF2B5EF4-FFF2-40B4-BE49-F238E27FC236}">
+                <a16:creationId xmlns:a16="http://schemas.microsoft.com/office/drawing/2014/main" id="{66B80481-E8FE-1F48-DBE3-984FF0106BC1}"/>
+              </a:ext>
+            </a:extLst>
+          </p:cNvPr>
+          <p:cNvSpPr txBox="1"/>
+          <p:nvPr/>
+        </p:nvSpPr>
+        <p:spPr>
+          <a:xfrm>
+            <a:off x="3798485" y="4398377"/>
+            <a:ext cx="2097250" cy="646331"/>
+          </a:xfrm>
+          <a:prstGeom prst="rect">
+            <a:avLst/>
+          </a:prstGeom>
+          <a:noFill/>
+        </p:spPr>
+        <p:txBody>
+          <a:bodyPr rot="0" spcFirstLastPara="0" vertOverflow="overflow" horzOverflow="overflow" vert="horz" wrap="square" lIns="91440" tIns="45720" rIns="91440" bIns="45720" numCol="1" spcCol="0" rtlCol="0" fromWordArt="0" anchor="t" anchorCtr="0" forceAA="0" compatLnSpc="1">
+            <a:prstTxWarp prst="textNoShape">
+              <a:avLst/>
+            </a:prstTxWarp>
+            <a:spAutoFit/>
+          </a:bodyPr>
+          <a:lstStyle/>
+          <a:p>
+            <a:pPr algn="ctr"/>
+            <a:r>
+              <a:rPr lang="en-US" sz="1200" dirty="0">
+                <a:latin typeface="Times New Roman"/>
+                <a:cs typeface="Times New Roman"/>
+              </a:rPr>
+              <a:t>presence of non-ideal  thrust engine models </a:t>
+            </a:r>
+            <a:endParaRPr lang="en-US" sz="1200">
+              <a:latin typeface="Times New Roman"/>
+              <a:ea typeface="Calibri" panose="020F0502020204030204"/>
+              <a:cs typeface="Calibri" panose="020F0502020204030204"/>
+            </a:endParaRPr>
+          </a:p>
+          <a:p>
+            <a:pPr algn="ctr"/>
+            <a:endParaRPr lang="en-US" sz="1200" dirty="0">
+              <a:latin typeface="Times New Roman"/>
+              <a:ea typeface="Calibri"/>
+              <a:cs typeface="Times New Roman"/>
+            </a:endParaRPr>
+          </a:p>
+        </p:txBody>
+      </p:sp>
+      <p:sp>
+        <p:nvSpPr>
+          <p:cNvPr id="17" name="TextBox 16">
+            <a:extLst>
+              <a:ext uri="{FF2B5EF4-FFF2-40B4-BE49-F238E27FC236}">
+                <a16:creationId xmlns:a16="http://schemas.microsoft.com/office/drawing/2014/main" id="{29D4B67A-B179-1D52-9B62-B75AB9CE9259}"/>
+              </a:ext>
+            </a:extLst>
+          </p:cNvPr>
+          <p:cNvSpPr txBox="1"/>
+          <p:nvPr/>
+        </p:nvSpPr>
+        <p:spPr>
+          <a:xfrm>
+            <a:off x="6513463" y="4398377"/>
+            <a:ext cx="2097250" cy="461665"/>
+          </a:xfrm>
+          <a:prstGeom prst="rect">
+            <a:avLst/>
+          </a:prstGeom>
+          <a:noFill/>
+        </p:spPr>
+        <p:txBody>
+          <a:bodyPr rot="0" spcFirstLastPara="0" vertOverflow="overflow" horzOverflow="overflow" vert="horz" wrap="square" lIns="91440" tIns="45720" rIns="91440" bIns="45720" numCol="1" spcCol="0" rtlCol="0" fromWordArt="0" anchor="t" anchorCtr="0" forceAA="0" compatLnSpc="1">
+            <a:prstTxWarp prst="textNoShape">
+              <a:avLst/>
+            </a:prstTxWarp>
+            <a:spAutoFit/>
+          </a:bodyPr>
+          <a:lstStyle/>
+          <a:p>
+            <a:pPr algn="ctr"/>
+            <a:r>
+              <a:rPr lang="en-US" sz="1200" dirty="0">
+                <a:latin typeface="Times New Roman"/>
+                <a:cs typeface="Times New Roman"/>
+              </a:rPr>
+              <a:t>presence of  disturbances</a:t>
+            </a:r>
+            <a:endParaRPr lang="en-US" sz="1200" dirty="0">
+              <a:latin typeface="Times New Roman"/>
+              <a:ea typeface="Calibri"/>
+              <a:cs typeface="Calibri"/>
+            </a:endParaRPr>
+          </a:p>
+          <a:p>
+            <a:pPr algn="ctr"/>
+            <a:endParaRPr lang="en-US" sz="1200" dirty="0">
+              <a:latin typeface="Times New Roman"/>
+              <a:ea typeface="Calibri"/>
+              <a:cs typeface="Calibri"/>
+            </a:endParaRPr>
+          </a:p>
+        </p:txBody>
+      </p:sp>
+    </p:spTree>
+    <p:extLst>
+      <p:ext uri="{BB962C8B-B14F-4D97-AF65-F5344CB8AC3E}">
+        <p14:creationId xmlns:p14="http://schemas.microsoft.com/office/powerpoint/2010/main" val="2552571191"/>
+      </p:ext>
+    </p:extLst>
+  </p:cSld>
+  <p:clrMapOvr>
+    <a:masterClrMapping/>
+  </p:clrMapOvr>
+</p:sld>
+</file>
+
+<file path=ppt/slides/slide13.xml><?xml version="1.0" encoding="utf-8"?>
+<p:sld xmlns:a="http://schemas.openxmlformats.org/drawingml/2006/main" xmlns:r="http://schemas.openxmlformats.org/officeDocument/2006/relationships" xmlns:p="http://schemas.openxmlformats.org/presentationml/2006/main">
+  <p:cSld>
+    <p:spTree>
+      <p:nvGrpSpPr>
+        <p:cNvPr id="1" name="">
+          <a:extLst>
+            <a:ext uri="{FF2B5EF4-FFF2-40B4-BE49-F238E27FC236}">
               <a16:creationId xmlns:a16="http://schemas.microsoft.com/office/drawing/2014/main" id="{72B21085-F7D4-75B2-CEDE-00172D42135B}"/>
             </a:ext>
           </a:extLst>
@@ -4478,7 +4924,7 @@
               <a:rPr lang="en-US" sz="1600" smtClean="0">
                 <a:cs typeface="David" panose="020E0502060401010101" pitchFamily="34" charset="-79"/>
               </a:rPr>
-              <a:t>12</a:t>
+              <a:t>13</a:t>
             </a:fld>
             <a:endParaRPr lang="en-US" sz="1600">
               <a:cs typeface="David" panose="020E0502060401010101" pitchFamily="34" charset="-79"/>
@@ -4569,7 +5015,7 @@
 </p:sld>
 </file>
 
-<file path=ppt/slides/slide13.xml><?xml version="1.0" encoding="utf-8"?>
+<file path=ppt/slides/slide14.xml><?xml version="1.0" encoding="utf-8"?>
 <p:sld xmlns:a="http://schemas.openxmlformats.org/drawingml/2006/main" xmlns:r="http://schemas.openxmlformats.org/officeDocument/2006/relationships" xmlns:p="http://schemas.openxmlformats.org/presentationml/2006/main">
   <p:cSld>
     <p:spTree>
@@ -4662,7 +5108,7 @@
               <a:rPr lang="en-US" sz="1600" smtClean="0">
                 <a:cs typeface="David" panose="020E0502060401010101" pitchFamily="34" charset="-79"/>
               </a:rPr>
-              <a:t>13</a:t>
+              <a:t>14</a:t>
             </a:fld>
             <a:endParaRPr lang="en-US" sz="1600">
               <a:cs typeface="David" panose="020E0502060401010101" pitchFamily="34" charset="-79"/>

</xml_diff>